<commit_message>
slides en file update
</commit_message>
<xml_diff>
--- a/Deliverables/Knowledge_acquisition_slides.pptx
+++ b/Deliverables/Knowledge_acquisition_slides.pptx
@@ -5,23 +5,27 @@
     <p:sldMasterId id="2147483648" r:id="rId1"/>
     <p:sldMasterId id="2147483660" r:id="rId2"/>
   </p:sldMasterIdLst>
+  <p:notesMasterIdLst>
+    <p:notesMasterId r:id="rId17"/>
+  </p:notesMasterIdLst>
   <p:handoutMasterIdLst>
-    <p:handoutMasterId r:id="rId16"/>
+    <p:handoutMasterId r:id="rId18"/>
   </p:handoutMasterIdLst>
   <p:sldIdLst>
     <p:sldId id="256" r:id="rId3"/>
-    <p:sldId id="266" r:id="rId4"/>
-    <p:sldId id="279" r:id="rId5"/>
-    <p:sldId id="280" r:id="rId6"/>
-    <p:sldId id="271" r:id="rId7"/>
-    <p:sldId id="274" r:id="rId8"/>
-    <p:sldId id="272" r:id="rId9"/>
-    <p:sldId id="269" r:id="rId10"/>
-    <p:sldId id="275" r:id="rId11"/>
-    <p:sldId id="276" r:id="rId12"/>
-    <p:sldId id="277" r:id="rId13"/>
-    <p:sldId id="278" r:id="rId14"/>
-    <p:sldId id="265" r:id="rId15"/>
+    <p:sldId id="281" r:id="rId4"/>
+    <p:sldId id="266" r:id="rId5"/>
+    <p:sldId id="279" r:id="rId6"/>
+    <p:sldId id="280" r:id="rId7"/>
+    <p:sldId id="271" r:id="rId8"/>
+    <p:sldId id="274" r:id="rId9"/>
+    <p:sldId id="272" r:id="rId10"/>
+    <p:sldId id="269" r:id="rId11"/>
+    <p:sldId id="275" r:id="rId12"/>
+    <p:sldId id="276" r:id="rId13"/>
+    <p:sldId id="277" r:id="rId14"/>
+    <p:sldId id="278" r:id="rId15"/>
+    <p:sldId id="265" r:id="rId16"/>
   </p:sldIdLst>
   <p:sldSz cx="9144000" cy="5143500" type="screen16x9"/>
   <p:notesSz cx="6858000" cy="9144000"/>
@@ -144,24 +148,32 @@
   <pc:docChgLst>
     <pc:chgData name="Stijn Nolet" userId="afbe0c02d883dce8" providerId="LiveId" clId="{A5C1A1CB-73C3-4602-988A-366E1FD7D011}"/>
     <pc:docChg chg="undo custSel addSld delSld modSld sldOrd">
-      <pc:chgData name="Stijn Nolet" userId="afbe0c02d883dce8" providerId="LiveId" clId="{A5C1A1CB-73C3-4602-988A-366E1FD7D011}" dt="2020-06-15T13:15:49.641" v="266" actId="20577"/>
+      <pc:chgData name="Stijn Nolet" userId="afbe0c02d883dce8" providerId="LiveId" clId="{A5C1A1CB-73C3-4602-988A-366E1FD7D011}" dt="2020-06-16T08:43:23.751" v="493" actId="1076"/>
       <pc:docMkLst>
         <pc:docMk/>
       </pc:docMkLst>
-      <pc:sldChg chg="modSp mod">
-        <pc:chgData name="Stijn Nolet" userId="afbe0c02d883dce8" providerId="LiveId" clId="{A5C1A1CB-73C3-4602-988A-366E1FD7D011}" dt="2020-06-15T13:15:49.641" v="266" actId="20577"/>
+      <pc:sldChg chg="addSp delSp modSp mod">
+        <pc:chgData name="Stijn Nolet" userId="afbe0c02d883dce8" providerId="LiveId" clId="{A5C1A1CB-73C3-4602-988A-366E1FD7D011}" dt="2020-06-16T08:42:07.159" v="489" actId="27636"/>
         <pc:sldMkLst>
           <pc:docMk/>
           <pc:sldMk cId="2739464900" sldId="265"/>
         </pc:sldMkLst>
         <pc:spChg chg="mod">
-          <ac:chgData name="Stijn Nolet" userId="afbe0c02d883dce8" providerId="LiveId" clId="{A5C1A1CB-73C3-4602-988A-366E1FD7D011}" dt="2020-06-15T13:15:49.641" v="266" actId="20577"/>
+          <ac:chgData name="Stijn Nolet" userId="afbe0c02d883dce8" providerId="LiveId" clId="{A5C1A1CB-73C3-4602-988A-366E1FD7D011}" dt="2020-06-16T08:42:07.159" v="489" actId="27636"/>
           <ac:spMkLst>
             <pc:docMk/>
             <pc:sldMk cId="2739464900" sldId="265"/>
             <ac:spMk id="3" creationId="{00000000-0000-0000-0000-000000000000}"/>
           </ac:spMkLst>
         </pc:spChg>
+        <pc:picChg chg="add del">
+          <ac:chgData name="Stijn Nolet" userId="afbe0c02d883dce8" providerId="LiveId" clId="{A5C1A1CB-73C3-4602-988A-366E1FD7D011}" dt="2020-06-16T08:39:49.020" v="439"/>
+          <ac:picMkLst>
+            <pc:docMk/>
+            <pc:sldMk cId="2739464900" sldId="265"/>
+            <ac:picMk id="4" creationId="{0F71DD0D-2B32-4E4C-99AA-6578795530DC}"/>
+          </ac:picMkLst>
+        </pc:picChg>
       </pc:sldChg>
       <pc:sldChg chg="ord">
         <pc:chgData name="Stijn Nolet" userId="afbe0c02d883dce8" providerId="LiveId" clId="{A5C1A1CB-73C3-4602-988A-366E1FD7D011}" dt="2020-06-15T13:08:42.720" v="125"/>
@@ -190,6 +202,76 @@
         <pc:sldMkLst>
           <pc:docMk/>
           <pc:sldMk cId="297783049" sldId="281"/>
+        </pc:sldMkLst>
+      </pc:sldChg>
+      <pc:sldChg chg="addSp delSp modSp add mod ord modNotesTx">
+        <pc:chgData name="Stijn Nolet" userId="afbe0c02d883dce8" providerId="LiveId" clId="{A5C1A1CB-73C3-4602-988A-366E1FD7D011}" dt="2020-06-16T08:43:23.751" v="493" actId="1076"/>
+        <pc:sldMkLst>
+          <pc:docMk/>
+          <pc:sldMk cId="1370085809" sldId="281"/>
+        </pc:sldMkLst>
+        <pc:spChg chg="mod">
+          <ac:chgData name="Stijn Nolet" userId="afbe0c02d883dce8" providerId="LiveId" clId="{A5C1A1CB-73C3-4602-988A-366E1FD7D011}" dt="2020-06-16T08:36:43.559" v="304" actId="1035"/>
+          <ac:spMkLst>
+            <pc:docMk/>
+            <pc:sldMk cId="1370085809" sldId="281"/>
+            <ac:spMk id="2" creationId="{00000000-0000-0000-0000-000000000000}"/>
+          </ac:spMkLst>
+        </pc:spChg>
+        <pc:spChg chg="add del mod">
+          <ac:chgData name="Stijn Nolet" userId="afbe0c02d883dce8" providerId="LiveId" clId="{A5C1A1CB-73C3-4602-988A-366E1FD7D011}" dt="2020-06-16T08:34:08.213" v="272" actId="478"/>
+          <ac:spMkLst>
+            <pc:docMk/>
+            <pc:sldMk cId="1370085809" sldId="281"/>
+            <ac:spMk id="3" creationId="{7A5D57C2-909C-4AC2-ABF9-BBB8711AF731}"/>
+          </ac:spMkLst>
+        </pc:spChg>
+        <pc:spChg chg="mod">
+          <ac:chgData name="Stijn Nolet" userId="afbe0c02d883dce8" providerId="LiveId" clId="{A5C1A1CB-73C3-4602-988A-366E1FD7D011}" dt="2020-06-16T08:34:12.332" v="273" actId="20577"/>
+          <ac:spMkLst>
+            <pc:docMk/>
+            <pc:sldMk cId="1370085809" sldId="281"/>
+            <ac:spMk id="6" creationId="{7DE0C257-CC7C-4C14-A625-9573E92996D5}"/>
+          </ac:spMkLst>
+        </pc:spChg>
+        <pc:spChg chg="add del mod">
+          <ac:chgData name="Stijn Nolet" userId="afbe0c02d883dce8" providerId="LiveId" clId="{A5C1A1CB-73C3-4602-988A-366E1FD7D011}" dt="2020-06-16T08:39:01.418" v="352" actId="478"/>
+          <ac:spMkLst>
+            <pc:docMk/>
+            <pc:sldMk cId="1370085809" sldId="281"/>
+            <ac:spMk id="8" creationId="{B786AB04-BE54-4FC1-989A-01701B01D440}"/>
+          </ac:spMkLst>
+        </pc:spChg>
+        <pc:picChg chg="del">
+          <ac:chgData name="Stijn Nolet" userId="afbe0c02d883dce8" providerId="LiveId" clId="{A5C1A1CB-73C3-4602-988A-366E1FD7D011}" dt="2020-06-16T08:34:01.231" v="270" actId="478"/>
+          <ac:picMkLst>
+            <pc:docMk/>
+            <pc:sldMk cId="1370085809" sldId="281"/>
+            <ac:picMk id="4" creationId="{407B8F6E-50E8-4D32-9D9A-11E3CE646B61}"/>
+          </ac:picMkLst>
+        </pc:picChg>
+        <pc:picChg chg="add mod modCrop">
+          <ac:chgData name="Stijn Nolet" userId="afbe0c02d883dce8" providerId="LiveId" clId="{A5C1A1CB-73C3-4602-988A-366E1FD7D011}" dt="2020-06-16T08:38:17.649" v="317" actId="1076"/>
+          <ac:picMkLst>
+            <pc:docMk/>
+            <pc:sldMk cId="1370085809" sldId="281"/>
+            <ac:picMk id="5" creationId="{58C48BC2-E555-401C-B913-22FA8EAF75C3}"/>
+          </ac:picMkLst>
+        </pc:picChg>
+        <pc:picChg chg="add mod">
+          <ac:chgData name="Stijn Nolet" userId="afbe0c02d883dce8" providerId="LiveId" clId="{A5C1A1CB-73C3-4602-988A-366E1FD7D011}" dt="2020-06-16T08:43:23.751" v="493" actId="1076"/>
+          <ac:picMkLst>
+            <pc:docMk/>
+            <pc:sldMk cId="1370085809" sldId="281"/>
+            <ac:picMk id="7" creationId="{DFE7F0EA-DB05-4753-AB55-A67598CA164D}"/>
+          </ac:picMkLst>
+        </pc:picChg>
+      </pc:sldChg>
+      <pc:sldChg chg="new del">
+        <pc:chgData name="Stijn Nolet" userId="afbe0c02d883dce8" providerId="LiveId" clId="{A5C1A1CB-73C3-4602-988A-366E1FD7D011}" dt="2020-06-16T08:33:48.330" v="268" actId="47"/>
+        <pc:sldMkLst>
+          <pc:docMk/>
+          <pc:sldMk cId="2699547748" sldId="281"/>
         </pc:sldMkLst>
       </pc:sldChg>
     </pc:docChg>
@@ -583,7 +665,7 @@
           <a:p>
             <a:fld id="{DBAE3B3E-782A-9745-8E84-372F7B6771BF}" type="datetimeFigureOut">
               <a:rPr lang="en-US" smtClean="0"/>
-              <a:t>6/15/2020</a:t>
+              <a:t>6/16/2020</a:t>
             </a:fld>
             <a:endParaRPr lang="en-US" dirty="0"/>
           </a:p>
@@ -664,6 +746,449 @@
   </p:cSld>
   <p:clrMap bg1="lt1" tx1="dk1" bg2="lt2" tx2="dk2" accent1="accent1" accent2="accent2" accent3="accent3" accent4="accent4" accent5="accent5" accent6="accent6" hlink="hlink" folHlink="folHlink"/>
 </p:handoutMaster>
+</file>
+
+<file path=ppt/notesMasters/notesMaster1.xml><?xml version="1.0" encoding="utf-8"?>
+<p:notesMaster xmlns:a="http://schemas.openxmlformats.org/drawingml/2006/main" xmlns:r="http://schemas.openxmlformats.org/officeDocument/2006/relationships" xmlns:p="http://schemas.openxmlformats.org/presentationml/2006/main">
+  <p:cSld>
+    <p:bg>
+      <p:bgRef idx="1001">
+        <a:schemeClr val="bg1"/>
+      </p:bgRef>
+    </p:bg>
+    <p:spTree>
+      <p:nvGrpSpPr>
+        <p:cNvPr id="1" name=""/>
+        <p:cNvGrpSpPr/>
+        <p:nvPr/>
+      </p:nvGrpSpPr>
+      <p:grpSpPr>
+        <a:xfrm>
+          <a:off x="0" y="0"/>
+          <a:ext cx="0" cy="0"/>
+          <a:chOff x="0" y="0"/>
+          <a:chExt cx="0" cy="0"/>
+        </a:xfrm>
+      </p:grpSpPr>
+      <p:sp>
+        <p:nvSpPr>
+          <p:cNvPr id="2" name="Tijdelijke aanduiding voor koptekst 1"/>
+          <p:cNvSpPr>
+            <a:spLocks noGrp="1"/>
+          </p:cNvSpPr>
+          <p:nvPr>
+            <p:ph type="hdr" sz="quarter"/>
+          </p:nvPr>
+        </p:nvSpPr>
+        <p:spPr>
+          <a:xfrm>
+            <a:off x="0" y="0"/>
+            <a:ext cx="2971800" cy="458788"/>
+          </a:xfrm>
+          <a:prstGeom prst="rect">
+            <a:avLst/>
+          </a:prstGeom>
+        </p:spPr>
+        <p:txBody>
+          <a:bodyPr vert="horz" lIns="91440" tIns="45720" rIns="91440" bIns="45720" rtlCol="0"/>
+          <a:lstStyle>
+            <a:lvl1pPr algn="l">
+              <a:defRPr sz="1200"/>
+            </a:lvl1pPr>
+          </a:lstStyle>
+          <a:p>
+            <a:endParaRPr lang="en-GB"/>
+          </a:p>
+        </p:txBody>
+      </p:sp>
+      <p:sp>
+        <p:nvSpPr>
+          <p:cNvPr id="3" name="Tijdelijke aanduiding voor datum 2"/>
+          <p:cNvSpPr>
+            <a:spLocks noGrp="1"/>
+          </p:cNvSpPr>
+          <p:nvPr>
+            <p:ph type="dt" idx="1"/>
+          </p:nvPr>
+        </p:nvSpPr>
+        <p:spPr>
+          <a:xfrm>
+            <a:off x="3884613" y="0"/>
+            <a:ext cx="2971800" cy="458788"/>
+          </a:xfrm>
+          <a:prstGeom prst="rect">
+            <a:avLst/>
+          </a:prstGeom>
+        </p:spPr>
+        <p:txBody>
+          <a:bodyPr vert="horz" lIns="91440" tIns="45720" rIns="91440" bIns="45720" rtlCol="0"/>
+          <a:lstStyle>
+            <a:lvl1pPr algn="r">
+              <a:defRPr sz="1200"/>
+            </a:lvl1pPr>
+          </a:lstStyle>
+          <a:p>
+            <a:fld id="{2781816D-E2A3-454A-92A9-7C8A7B0BF7E0}" type="datetimeFigureOut">
+              <a:rPr lang="en-GB" smtClean="0"/>
+              <a:t>16/06/2020</a:t>
+            </a:fld>
+            <a:endParaRPr lang="en-GB"/>
+          </a:p>
+        </p:txBody>
+      </p:sp>
+      <p:sp>
+        <p:nvSpPr>
+          <p:cNvPr id="4" name="Tijdelijke aanduiding voor dia-afbeelding 3"/>
+          <p:cNvSpPr>
+            <a:spLocks noGrp="1" noRot="1" noChangeAspect="1"/>
+          </p:cNvSpPr>
+          <p:nvPr>
+            <p:ph type="sldImg" idx="2"/>
+          </p:nvPr>
+        </p:nvSpPr>
+        <p:spPr>
+          <a:xfrm>
+            <a:off x="685800" y="1143000"/>
+            <a:ext cx="5486400" cy="3086100"/>
+          </a:xfrm>
+          <a:prstGeom prst="rect">
+            <a:avLst/>
+          </a:prstGeom>
+          <a:noFill/>
+          <a:ln w="12700">
+            <a:solidFill>
+              <a:prstClr val="black"/>
+            </a:solidFill>
+          </a:ln>
+        </p:spPr>
+        <p:txBody>
+          <a:bodyPr vert="horz" lIns="91440" tIns="45720" rIns="91440" bIns="45720" rtlCol="0" anchor="ctr"/>
+          <a:lstStyle/>
+          <a:p>
+            <a:endParaRPr lang="en-GB"/>
+          </a:p>
+        </p:txBody>
+      </p:sp>
+      <p:sp>
+        <p:nvSpPr>
+          <p:cNvPr id="5" name="Tijdelijke aanduiding voor notities 4"/>
+          <p:cNvSpPr>
+            <a:spLocks noGrp="1"/>
+          </p:cNvSpPr>
+          <p:nvPr>
+            <p:ph type="body" sz="quarter" idx="3"/>
+          </p:nvPr>
+        </p:nvSpPr>
+        <p:spPr>
+          <a:xfrm>
+            <a:off x="685800" y="4400550"/>
+            <a:ext cx="5486400" cy="3600450"/>
+          </a:xfrm>
+          <a:prstGeom prst="rect">
+            <a:avLst/>
+          </a:prstGeom>
+        </p:spPr>
+        <p:txBody>
+          <a:bodyPr vert="horz" lIns="91440" tIns="45720" rIns="91440" bIns="45720" rtlCol="0"/>
+          <a:lstStyle/>
+          <a:p>
+            <a:pPr lvl="0"/>
+            <a:r>
+              <a:rPr lang="nl-NL"/>
+              <a:t>Klikken om de tekststijl van het model te bewerken</a:t>
+            </a:r>
+          </a:p>
+          <a:p>
+            <a:pPr lvl="1"/>
+            <a:r>
+              <a:rPr lang="nl-NL"/>
+              <a:t>Tweede niveau</a:t>
+            </a:r>
+          </a:p>
+          <a:p>
+            <a:pPr lvl="2"/>
+            <a:r>
+              <a:rPr lang="nl-NL"/>
+              <a:t>Derde niveau</a:t>
+            </a:r>
+          </a:p>
+          <a:p>
+            <a:pPr lvl="3"/>
+            <a:r>
+              <a:rPr lang="nl-NL"/>
+              <a:t>Vierde niveau</a:t>
+            </a:r>
+          </a:p>
+          <a:p>
+            <a:pPr lvl="4"/>
+            <a:r>
+              <a:rPr lang="nl-NL"/>
+              <a:t>Vijfde niveau</a:t>
+            </a:r>
+            <a:endParaRPr lang="en-GB"/>
+          </a:p>
+        </p:txBody>
+      </p:sp>
+      <p:sp>
+        <p:nvSpPr>
+          <p:cNvPr id="6" name="Tijdelijke aanduiding voor voettekst 5"/>
+          <p:cNvSpPr>
+            <a:spLocks noGrp="1"/>
+          </p:cNvSpPr>
+          <p:nvPr>
+            <p:ph type="ftr" sz="quarter" idx="4"/>
+          </p:nvPr>
+        </p:nvSpPr>
+        <p:spPr>
+          <a:xfrm>
+            <a:off x="0" y="8685213"/>
+            <a:ext cx="2971800" cy="458787"/>
+          </a:xfrm>
+          <a:prstGeom prst="rect">
+            <a:avLst/>
+          </a:prstGeom>
+        </p:spPr>
+        <p:txBody>
+          <a:bodyPr vert="horz" lIns="91440" tIns="45720" rIns="91440" bIns="45720" rtlCol="0" anchor="b"/>
+          <a:lstStyle>
+            <a:lvl1pPr algn="l">
+              <a:defRPr sz="1200"/>
+            </a:lvl1pPr>
+          </a:lstStyle>
+          <a:p>
+            <a:endParaRPr lang="en-GB"/>
+          </a:p>
+        </p:txBody>
+      </p:sp>
+      <p:sp>
+        <p:nvSpPr>
+          <p:cNvPr id="7" name="Tijdelijke aanduiding voor dianummer 6"/>
+          <p:cNvSpPr>
+            <a:spLocks noGrp="1"/>
+          </p:cNvSpPr>
+          <p:nvPr>
+            <p:ph type="sldNum" sz="quarter" idx="5"/>
+          </p:nvPr>
+        </p:nvSpPr>
+        <p:spPr>
+          <a:xfrm>
+            <a:off x="3884613" y="8685213"/>
+            <a:ext cx="2971800" cy="458787"/>
+          </a:xfrm>
+          <a:prstGeom prst="rect">
+            <a:avLst/>
+          </a:prstGeom>
+        </p:spPr>
+        <p:txBody>
+          <a:bodyPr vert="horz" lIns="91440" tIns="45720" rIns="91440" bIns="45720" rtlCol="0" anchor="b"/>
+          <a:lstStyle>
+            <a:lvl1pPr algn="r">
+              <a:defRPr sz="1200"/>
+            </a:lvl1pPr>
+          </a:lstStyle>
+          <a:p>
+            <a:fld id="{657BAC57-20E9-41AA-BD35-C5294DEE652B}" type="slidenum">
+              <a:rPr lang="en-GB" smtClean="0"/>
+              <a:t>‹nr.›</a:t>
+            </a:fld>
+            <a:endParaRPr lang="en-GB"/>
+          </a:p>
+        </p:txBody>
+      </p:sp>
+    </p:spTree>
+    <p:extLst>
+      <p:ext uri="{BB962C8B-B14F-4D97-AF65-F5344CB8AC3E}">
+        <p14:creationId xmlns:p14="http://schemas.microsoft.com/office/powerpoint/2010/main" val="3163552847"/>
+      </p:ext>
+    </p:extLst>
+  </p:cSld>
+  <p:clrMap bg1="lt1" tx1="dk1" bg2="lt2" tx2="dk2" accent1="accent1" accent2="accent2" accent3="accent3" accent4="accent4" accent5="accent5" accent6="accent6" hlink="hlink" folHlink="folHlink"/>
+  <p:notesStyle>
+    <a:lvl1pPr marL="0" algn="l" defTabSz="914400" rtl="0" eaLnBrk="1" latinLnBrk="0" hangingPunct="1">
+      <a:defRPr sz="1200" kern="1200">
+        <a:solidFill>
+          <a:schemeClr val="tx1"/>
+        </a:solidFill>
+        <a:latin typeface="+mn-lt"/>
+        <a:ea typeface="+mn-ea"/>
+        <a:cs typeface="+mn-cs"/>
+      </a:defRPr>
+    </a:lvl1pPr>
+    <a:lvl2pPr marL="457200" algn="l" defTabSz="914400" rtl="0" eaLnBrk="1" latinLnBrk="0" hangingPunct="1">
+      <a:defRPr sz="1200" kern="1200">
+        <a:solidFill>
+          <a:schemeClr val="tx1"/>
+        </a:solidFill>
+        <a:latin typeface="+mn-lt"/>
+        <a:ea typeface="+mn-ea"/>
+        <a:cs typeface="+mn-cs"/>
+      </a:defRPr>
+    </a:lvl2pPr>
+    <a:lvl3pPr marL="914400" algn="l" defTabSz="914400" rtl="0" eaLnBrk="1" latinLnBrk="0" hangingPunct="1">
+      <a:defRPr sz="1200" kern="1200">
+        <a:solidFill>
+          <a:schemeClr val="tx1"/>
+        </a:solidFill>
+        <a:latin typeface="+mn-lt"/>
+        <a:ea typeface="+mn-ea"/>
+        <a:cs typeface="+mn-cs"/>
+      </a:defRPr>
+    </a:lvl3pPr>
+    <a:lvl4pPr marL="1371600" algn="l" defTabSz="914400" rtl="0" eaLnBrk="1" latinLnBrk="0" hangingPunct="1">
+      <a:defRPr sz="1200" kern="1200">
+        <a:solidFill>
+          <a:schemeClr val="tx1"/>
+        </a:solidFill>
+        <a:latin typeface="+mn-lt"/>
+        <a:ea typeface="+mn-ea"/>
+        <a:cs typeface="+mn-cs"/>
+      </a:defRPr>
+    </a:lvl4pPr>
+    <a:lvl5pPr marL="1828800" algn="l" defTabSz="914400" rtl="0" eaLnBrk="1" latinLnBrk="0" hangingPunct="1">
+      <a:defRPr sz="1200" kern="1200">
+        <a:solidFill>
+          <a:schemeClr val="tx1"/>
+        </a:solidFill>
+        <a:latin typeface="+mn-lt"/>
+        <a:ea typeface="+mn-ea"/>
+        <a:cs typeface="+mn-cs"/>
+      </a:defRPr>
+    </a:lvl5pPr>
+    <a:lvl6pPr marL="2286000" algn="l" defTabSz="914400" rtl="0" eaLnBrk="1" latinLnBrk="0" hangingPunct="1">
+      <a:defRPr sz="1200" kern="1200">
+        <a:solidFill>
+          <a:schemeClr val="tx1"/>
+        </a:solidFill>
+        <a:latin typeface="+mn-lt"/>
+        <a:ea typeface="+mn-ea"/>
+        <a:cs typeface="+mn-cs"/>
+      </a:defRPr>
+    </a:lvl6pPr>
+    <a:lvl7pPr marL="2743200" algn="l" defTabSz="914400" rtl="0" eaLnBrk="1" latinLnBrk="0" hangingPunct="1">
+      <a:defRPr sz="1200" kern="1200">
+        <a:solidFill>
+          <a:schemeClr val="tx1"/>
+        </a:solidFill>
+        <a:latin typeface="+mn-lt"/>
+        <a:ea typeface="+mn-ea"/>
+        <a:cs typeface="+mn-cs"/>
+      </a:defRPr>
+    </a:lvl7pPr>
+    <a:lvl8pPr marL="3200400" algn="l" defTabSz="914400" rtl="0" eaLnBrk="1" latinLnBrk="0" hangingPunct="1">
+      <a:defRPr sz="1200" kern="1200">
+        <a:solidFill>
+          <a:schemeClr val="tx1"/>
+        </a:solidFill>
+        <a:latin typeface="+mn-lt"/>
+        <a:ea typeface="+mn-ea"/>
+        <a:cs typeface="+mn-cs"/>
+      </a:defRPr>
+    </a:lvl8pPr>
+    <a:lvl9pPr marL="3657600" algn="l" defTabSz="914400" rtl="0" eaLnBrk="1" latinLnBrk="0" hangingPunct="1">
+      <a:defRPr sz="1200" kern="1200">
+        <a:solidFill>
+          <a:schemeClr val="tx1"/>
+        </a:solidFill>
+        <a:latin typeface="+mn-lt"/>
+        <a:ea typeface="+mn-ea"/>
+        <a:cs typeface="+mn-cs"/>
+      </a:defRPr>
+    </a:lvl9pPr>
+  </p:notesStyle>
+</p:notesMaster>
+</file>
+
+<file path=ppt/notesSlides/notesSlide1.xml><?xml version="1.0" encoding="utf-8"?>
+<p:notes xmlns:a="http://schemas.openxmlformats.org/drawingml/2006/main" xmlns:r="http://schemas.openxmlformats.org/officeDocument/2006/relationships" xmlns:p="http://schemas.openxmlformats.org/presentationml/2006/main">
+  <p:cSld>
+    <p:spTree>
+      <p:nvGrpSpPr>
+        <p:cNvPr id="1" name=""/>
+        <p:cNvGrpSpPr/>
+        <p:nvPr/>
+      </p:nvGrpSpPr>
+      <p:grpSpPr>
+        <a:xfrm>
+          <a:off x="0" y="0"/>
+          <a:ext cx="0" cy="0"/>
+          <a:chOff x="0" y="0"/>
+          <a:chExt cx="0" cy="0"/>
+        </a:xfrm>
+      </p:grpSpPr>
+      <p:sp>
+        <p:nvSpPr>
+          <p:cNvPr id="2" name="Tijdelijke aanduiding voor dia-afbeelding 1"/>
+          <p:cNvSpPr>
+            <a:spLocks noGrp="1" noRot="1" noChangeAspect="1"/>
+          </p:cNvSpPr>
+          <p:nvPr>
+            <p:ph type="sldImg"/>
+          </p:nvPr>
+        </p:nvSpPr>
+        <p:spPr/>
+      </p:sp>
+      <p:sp>
+        <p:nvSpPr>
+          <p:cNvPr id="3" name="Tijdelijke aanduiding voor notities 2"/>
+          <p:cNvSpPr>
+            <a:spLocks noGrp="1"/>
+          </p:cNvSpPr>
+          <p:nvPr>
+            <p:ph type="body" idx="1"/>
+          </p:nvPr>
+        </p:nvSpPr>
+        <p:spPr/>
+        <p:txBody>
+          <a:bodyPr/>
+          <a:lstStyle/>
+          <a:p>
+            <a:r>
+              <a:rPr lang="en-GB" dirty="0"/>
+              <a:t>Book is for basic spoiler principles</a:t>
+            </a:r>
+          </a:p>
+          <a:p>
+            <a:r>
+              <a:rPr lang="en-GB" dirty="0"/>
+              <a:t>Regulations is for more detailed modelling</a:t>
+            </a:r>
+          </a:p>
+        </p:txBody>
+      </p:sp>
+      <p:sp>
+        <p:nvSpPr>
+          <p:cNvPr id="4" name="Tijdelijke aanduiding voor dianummer 3"/>
+          <p:cNvSpPr>
+            <a:spLocks noGrp="1"/>
+          </p:cNvSpPr>
+          <p:nvPr>
+            <p:ph type="sldNum" sz="quarter" idx="5"/>
+          </p:nvPr>
+        </p:nvSpPr>
+        <p:spPr/>
+        <p:txBody>
+          <a:bodyPr/>
+          <a:lstStyle/>
+          <a:p>
+            <a:fld id="{657BAC57-20E9-41AA-BD35-C5294DEE652B}" type="slidenum">
+              <a:rPr lang="en-GB" smtClean="0"/>
+              <a:t>2</a:t>
+            </a:fld>
+            <a:endParaRPr lang="en-GB"/>
+          </a:p>
+        </p:txBody>
+      </p:sp>
+    </p:spTree>
+    <p:extLst>
+      <p:ext uri="{BB962C8B-B14F-4D97-AF65-F5344CB8AC3E}">
+        <p14:creationId xmlns:p14="http://schemas.microsoft.com/office/powerpoint/2010/main" val="1214281542"/>
+      </p:ext>
+    </p:extLst>
+  </p:cSld>
+  <p:clrMapOvr>
+    <a:masterClrMapping/>
+  </p:clrMapOvr>
+</p:notes>
 </file>
 
 <file path=ppt/slideLayouts/slideLayout1.xml><?xml version="1.0" encoding="utf-8"?>
@@ -1323,7 +1848,7 @@
           <a:p>
             <a:fld id="{462A2416-1570-3849-86F9-07F78746E1B2}" type="datetimeFigureOut">
               <a:rPr lang="en-US" smtClean="0"/>
-              <a:t>6/15/2020</a:t>
+              <a:t>6/16/2020</a:t>
             </a:fld>
             <a:endParaRPr lang="en-US" dirty="0"/>
           </a:p>
@@ -2772,6 +3297,239 @@
           <a:chExt cx="0" cy="0"/>
         </a:xfrm>
       </p:grpSpPr>
+      <p:sp>
+        <p:nvSpPr>
+          <p:cNvPr id="3" name="Tijdelijke aanduiding voor inhoud 2">
+            <a:extLst>
+              <a:ext uri="{FF2B5EF4-FFF2-40B4-BE49-F238E27FC236}">
+                <a16:creationId xmlns:a16="http://schemas.microsoft.com/office/drawing/2014/main" id="{4BDD7784-D850-43C8-A462-B1828A78467F}"/>
+              </a:ext>
+            </a:extLst>
+          </p:cNvPr>
+          <p:cNvSpPr>
+            <a:spLocks noGrp="1"/>
+          </p:cNvSpPr>
+          <p:nvPr>
+            <p:ph idx="1"/>
+          </p:nvPr>
+        </p:nvSpPr>
+        <p:spPr/>
+        <p:txBody>
+          <a:bodyPr>
+            <a:normAutofit lnSpcReduction="10000"/>
+          </a:bodyPr>
+          <a:lstStyle/>
+          <a:p>
+            <a:r>
+              <a:rPr lang="en-GB" dirty="0"/>
+              <a:t>The spoiler is modelled as a beam using the Euler-</a:t>
+            </a:r>
+            <a:r>
+              <a:rPr lang="en-GB" dirty="0" err="1"/>
+              <a:t>Bernouli</a:t>
+            </a:r>
+            <a:r>
+              <a:rPr lang="en-GB" dirty="0"/>
+              <a:t> beam theory.</a:t>
+            </a:r>
+          </a:p>
+          <a:p>
+            <a:endParaRPr lang="en-GB" dirty="0"/>
+          </a:p>
+          <a:p>
+            <a:endParaRPr lang="en-GB" dirty="0"/>
+          </a:p>
+          <a:p>
+            <a:r>
+              <a:rPr lang="en-GB" dirty="0"/>
+              <a:t>Bending and shear is </a:t>
+            </a:r>
+            <a:br>
+              <a:rPr lang="en-GB" dirty="0"/>
+            </a:br>
+            <a:r>
+              <a:rPr lang="en-GB" dirty="0"/>
+              <a:t>calculated using the </a:t>
+            </a:r>
+            <a:br>
+              <a:rPr lang="en-GB" dirty="0"/>
+            </a:br>
+            <a:r>
+              <a:rPr lang="en-GB" dirty="0"/>
+              <a:t>methods described in </a:t>
+            </a:r>
+            <a:br>
+              <a:rPr lang="en-GB" dirty="0"/>
+            </a:br>
+            <a:r>
+              <a:rPr lang="en-GB" dirty="0" err="1"/>
+              <a:t>Megson</a:t>
+            </a:r>
+            <a:r>
+              <a:rPr lang="en-GB" dirty="0"/>
+              <a:t>.</a:t>
+            </a:r>
+          </a:p>
+          <a:p>
+            <a:endParaRPr lang="en-GB" dirty="0"/>
+          </a:p>
+          <a:p>
+            <a:pPr lvl="1"/>
+            <a:endParaRPr lang="nl-NL" b="0" dirty="0"/>
+          </a:p>
+          <a:p>
+            <a:pPr lvl="1"/>
+            <a:endParaRPr lang="en-GB" dirty="0"/>
+          </a:p>
+          <a:p>
+            <a:pPr marL="457200" lvl="1" indent="0">
+              <a:buNone/>
+            </a:pPr>
+            <a:endParaRPr lang="en-GB" dirty="0"/>
+          </a:p>
+        </p:txBody>
+      </p:sp>
+      <p:pic>
+        <p:nvPicPr>
+          <p:cNvPr id="2050" name="Picture 2" descr="encrypted-tbn0.gstatic.com/images?q=tbn:ANd9GcT...">
+            <a:extLst>
+              <a:ext uri="{FF2B5EF4-FFF2-40B4-BE49-F238E27FC236}">
+                <a16:creationId xmlns:a16="http://schemas.microsoft.com/office/drawing/2014/main" id="{96AD8779-3E5D-4A82-957E-2D1E51D26DDD}"/>
+              </a:ext>
+            </a:extLst>
+          </p:cNvPr>
+          <p:cNvPicPr>
+            <a:picLocks noChangeAspect="1" noChangeArrowheads="1"/>
+          </p:cNvPicPr>
+          <p:nvPr/>
+        </p:nvPicPr>
+        <p:blipFill>
+          <a:blip r:embed="rId2">
+            <a:extLst>
+              <a:ext uri="{28A0092B-C50C-407E-A947-70E740481C1C}">
+                <a14:useLocalDpi xmlns:a14="http://schemas.microsoft.com/office/drawing/2010/main" val="0"/>
+              </a:ext>
+            </a:extLst>
+          </a:blip>
+          <a:srcRect/>
+          <a:stretch>
+            <a:fillRect/>
+          </a:stretch>
+        </p:blipFill>
+        <p:spPr bwMode="auto">
+          <a:xfrm>
+            <a:off x="6429440" y="2598359"/>
+            <a:ext cx="1902908" cy="2338044"/>
+          </a:xfrm>
+          <a:prstGeom prst="rect">
+            <a:avLst/>
+          </a:prstGeom>
+          <a:noFill/>
+          <a:extLst>
+            <a:ext uri="{909E8E84-426E-40DD-AFC4-6F175D3DCCD1}">
+              <a14:hiddenFill xmlns:a14="http://schemas.microsoft.com/office/drawing/2010/main">
+                <a:solidFill>
+                  <a:srgbClr val="FFFFFF"/>
+                </a:solidFill>
+              </a14:hiddenFill>
+            </a:ext>
+          </a:extLst>
+        </p:spPr>
+      </p:pic>
+      <p:sp>
+        <p:nvSpPr>
+          <p:cNvPr id="2" name="Title 1"/>
+          <p:cNvSpPr>
+            <a:spLocks noGrp="1"/>
+          </p:cNvSpPr>
+          <p:nvPr>
+            <p:ph type="title"/>
+          </p:nvPr>
+        </p:nvSpPr>
+        <p:spPr>
+          <a:xfrm>
+            <a:off x="1708304" y="207097"/>
+            <a:ext cx="7603588" cy="857250"/>
+          </a:xfrm>
+        </p:spPr>
+        <p:txBody>
+          <a:bodyPr>
+            <a:normAutofit/>
+          </a:bodyPr>
+          <a:lstStyle/>
+          <a:p>
+            <a:r>
+              <a:rPr lang="en-US" sz="3200" dirty="0"/>
+              <a:t>Structural analysis: bending calculations</a:t>
+            </a:r>
+          </a:p>
+        </p:txBody>
+      </p:sp>
+      <p:pic>
+        <p:nvPicPr>
+          <p:cNvPr id="4" name="Afbeelding 3">
+            <a:extLst>
+              <a:ext uri="{FF2B5EF4-FFF2-40B4-BE49-F238E27FC236}">
+                <a16:creationId xmlns:a16="http://schemas.microsoft.com/office/drawing/2014/main" id="{5E8E0B81-69D6-481C-927D-59C6E20FF982}"/>
+              </a:ext>
+            </a:extLst>
+          </p:cNvPr>
+          <p:cNvPicPr>
+            <a:picLocks noChangeAspect="1"/>
+          </p:cNvPicPr>
+          <p:nvPr/>
+        </p:nvPicPr>
+        <p:blipFill>
+          <a:blip r:embed="rId3"/>
+          <a:stretch>
+            <a:fillRect/>
+          </a:stretch>
+        </p:blipFill>
+        <p:spPr>
+          <a:xfrm>
+            <a:off x="2645817" y="2103399"/>
+            <a:ext cx="3246401" cy="685859"/>
+          </a:xfrm>
+          <a:prstGeom prst="rect">
+            <a:avLst/>
+          </a:prstGeom>
+          <a:ln>
+            <a:solidFill>
+              <a:schemeClr val="tx1"/>
+            </a:solidFill>
+          </a:ln>
+        </p:spPr>
+      </p:pic>
+    </p:spTree>
+    <p:extLst>
+      <p:ext uri="{BB962C8B-B14F-4D97-AF65-F5344CB8AC3E}">
+        <p14:creationId xmlns:p14="http://schemas.microsoft.com/office/powerpoint/2010/main" val="3674575570"/>
+      </p:ext>
+    </p:extLst>
+  </p:cSld>
+  <p:clrMapOvr>
+    <a:masterClrMapping/>
+  </p:clrMapOvr>
+</p:sld>
+</file>
+
+<file path=ppt/slides/slide11.xml><?xml version="1.0" encoding="utf-8"?>
+<p:sld xmlns:a="http://schemas.openxmlformats.org/drawingml/2006/main" xmlns:r="http://schemas.openxmlformats.org/officeDocument/2006/relationships" xmlns:p="http://schemas.openxmlformats.org/presentationml/2006/main">
+  <p:cSld>
+    <p:spTree>
+      <p:nvGrpSpPr>
+        <p:cNvPr id="1" name=""/>
+        <p:cNvGrpSpPr/>
+        <p:nvPr/>
+      </p:nvGrpSpPr>
+      <p:grpSpPr>
+        <a:xfrm>
+          <a:off x="0" y="0"/>
+          <a:ext cx="0" cy="0"/>
+          <a:chOff x="0" y="0"/>
+          <a:chExt cx="0" cy="0"/>
+        </a:xfrm>
+      </p:grpSpPr>
       <mc:AlternateContent xmlns:mc="http://schemas.openxmlformats.org/markup-compatibility/2006" xmlns:a14="http://schemas.microsoft.com/office/drawing/2010/main">
         <mc:Choice Requires="a14">
           <p:sp>
@@ -3081,7 +3839,7 @@
 </p:sld>
 </file>
 
-<file path=ppt/slides/slide11.xml><?xml version="1.0" encoding="utf-8"?>
+<file path=ppt/slides/slide12.xml><?xml version="1.0" encoding="utf-8"?>
 <p:sld xmlns:a="http://schemas.openxmlformats.org/drawingml/2006/main" xmlns:r="http://schemas.openxmlformats.org/officeDocument/2006/relationships" xmlns:p="http://schemas.openxmlformats.org/presentationml/2006/main">
   <p:cSld>
     <p:spTree>
@@ -3468,7 +4226,7 @@
 </p:sld>
 </file>
 
-<file path=ppt/slides/slide12.xml><?xml version="1.0" encoding="utf-8"?>
+<file path=ppt/slides/slide13.xml><?xml version="1.0" encoding="utf-8"?>
 <p:sld xmlns:a="http://schemas.openxmlformats.org/drawingml/2006/main" xmlns:r="http://schemas.openxmlformats.org/officeDocument/2006/relationships" xmlns:p="http://schemas.openxmlformats.org/presentationml/2006/main">
   <p:cSld>
     <p:spTree>
@@ -3627,7 +4385,7 @@
 </p:sld>
 </file>
 
-<file path=ppt/slides/slide13.xml><?xml version="1.0" encoding="utf-8"?>
+<file path=ppt/slides/slide14.xml><?xml version="1.0" encoding="utf-8"?>
 <p:sld xmlns:a="http://schemas.openxmlformats.org/drawingml/2006/main" xmlns:r="http://schemas.openxmlformats.org/officeDocument/2006/relationships" xmlns:p="http://schemas.openxmlformats.org/presentationml/2006/main">
   <p:cSld>
     <p:spTree>
@@ -3684,7 +4442,7 @@
         </p:spPr>
         <p:txBody>
           <a:bodyPr>
-            <a:normAutofit lnSpcReduction="10000"/>
+            <a:normAutofit fontScale="92500" lnSpcReduction="20000"/>
           </a:bodyPr>
           <a:lstStyle/>
           <a:p>
@@ -3744,6 +4502,20 @@
               <a:t>Torenbeek</a:t>
             </a:r>
             <a:endParaRPr lang="en-US" sz="2400" dirty="0"/>
+          </a:p>
+          <a:p>
+            <a:r>
+              <a:rPr lang="en-US" sz="2400" dirty="0"/>
+              <a:t>Aerodynamics of Road Vehicles : From Fluid Mechanics to Vehicle Engineering, Wolf-Heinrich </a:t>
+            </a:r>
+            <a:r>
+              <a:rPr lang="en-US" sz="2400" dirty="0" err="1"/>
+              <a:t>Hucho</a:t>
+            </a:r>
+            <a:r>
+              <a:rPr lang="en-US" sz="2400" dirty="0"/>
+              <a:t>, Elsevier Science &amp; Technology, 1987.</a:t>
+            </a:r>
           </a:p>
           <a:p>
             <a:r>
@@ -3767,6 +4539,303 @@
 </file>
 
 <file path=ppt/slides/slide2.xml><?xml version="1.0" encoding="utf-8"?>
+<p:sld xmlns:a="http://schemas.openxmlformats.org/drawingml/2006/main" xmlns:r="http://schemas.openxmlformats.org/officeDocument/2006/relationships" xmlns:p="http://schemas.openxmlformats.org/presentationml/2006/main">
+  <p:cSld>
+    <p:spTree>
+      <p:nvGrpSpPr>
+        <p:cNvPr id="1" name=""/>
+        <p:cNvGrpSpPr/>
+        <p:nvPr/>
+      </p:nvGrpSpPr>
+      <p:grpSpPr>
+        <a:xfrm>
+          <a:off x="0" y="0"/>
+          <a:ext cx="0" cy="0"/>
+          <a:chOff x="0" y="0"/>
+          <a:chExt cx="0" cy="0"/>
+        </a:xfrm>
+      </p:grpSpPr>
+      <p:sp>
+        <p:nvSpPr>
+          <p:cNvPr id="2" name="Title 1"/>
+          <p:cNvSpPr>
+            <a:spLocks noGrp="1"/>
+          </p:cNvSpPr>
+          <p:nvPr>
+            <p:ph type="title"/>
+          </p:nvPr>
+        </p:nvSpPr>
+        <p:spPr>
+          <a:xfrm>
+            <a:off x="1469153" y="212477"/>
+            <a:ext cx="7603588" cy="857250"/>
+          </a:xfrm>
+        </p:spPr>
+        <p:txBody>
+          <a:bodyPr>
+            <a:normAutofit fontScale="90000"/>
+          </a:bodyPr>
+          <a:lstStyle/>
+          <a:p>
+            <a:pPr algn="ctr"/>
+            <a:r>
+              <a:rPr lang="en-US" sz="3200" dirty="0"/>
+              <a:t>“Knowledge” for parametric model of high-performance spoiler design</a:t>
+            </a:r>
+          </a:p>
+        </p:txBody>
+      </p:sp>
+      <p:sp>
+        <p:nvSpPr>
+          <p:cNvPr id="6" name="Tijdelijke aanduiding voor inhoud 2">
+            <a:extLst>
+              <a:ext uri="{FF2B5EF4-FFF2-40B4-BE49-F238E27FC236}">
+                <a16:creationId xmlns:a16="http://schemas.microsoft.com/office/drawing/2014/main" id="{7DE0C257-CC7C-4C14-A625-9573E92996D5}"/>
+              </a:ext>
+            </a:extLst>
+          </p:cNvPr>
+          <p:cNvSpPr txBox="1">
+            <a:spLocks/>
+          </p:cNvSpPr>
+          <p:nvPr/>
+        </p:nvSpPr>
+        <p:spPr>
+          <a:xfrm>
+            <a:off x="1629291" y="1657378"/>
+            <a:ext cx="7106464" cy="3486122"/>
+          </a:xfrm>
+          <a:prstGeom prst="rect">
+            <a:avLst/>
+          </a:prstGeom>
+        </p:spPr>
+        <p:txBody>
+          <a:bodyPr vert="horz" lIns="91440" tIns="45720" rIns="91440" bIns="45720" rtlCol="0">
+            <a:normAutofit/>
+          </a:bodyPr>
+          <a:lstStyle>
+            <a:lvl1pPr marL="342900" indent="-342900" algn="l" defTabSz="457200" rtl="0" eaLnBrk="1" latinLnBrk="0" hangingPunct="1">
+              <a:spcBef>
+                <a:spcPct val="20000"/>
+              </a:spcBef>
+              <a:buClr>
+                <a:srgbClr val="00A6D6"/>
+              </a:buClr>
+              <a:buFont typeface="Arial"/>
+              <a:buChar char="•"/>
+              <a:defRPr sz="2800" kern="1200">
+                <a:solidFill>
+                  <a:schemeClr val="tx1"/>
+                </a:solidFill>
+                <a:latin typeface="Arial"/>
+                <a:ea typeface="+mn-ea"/>
+                <a:cs typeface="Arial"/>
+              </a:defRPr>
+            </a:lvl1pPr>
+            <a:lvl2pPr marL="742950" indent="-285750" algn="l" defTabSz="457200" rtl="0" eaLnBrk="1" latinLnBrk="0" hangingPunct="1">
+              <a:spcBef>
+                <a:spcPct val="20000"/>
+              </a:spcBef>
+              <a:buClr>
+                <a:srgbClr val="00A6D6"/>
+              </a:buClr>
+              <a:buFont typeface="Arial"/>
+              <a:buChar char="–"/>
+              <a:defRPr sz="2400" kern="1200">
+                <a:solidFill>
+                  <a:schemeClr val="tx1"/>
+                </a:solidFill>
+                <a:latin typeface="Arial"/>
+                <a:ea typeface="+mn-ea"/>
+                <a:cs typeface="Arial"/>
+              </a:defRPr>
+            </a:lvl2pPr>
+            <a:lvl3pPr marL="1143000" indent="-228600" algn="l" defTabSz="457200" rtl="0" eaLnBrk="1" latinLnBrk="0" hangingPunct="1">
+              <a:spcBef>
+                <a:spcPct val="20000"/>
+              </a:spcBef>
+              <a:buClr>
+                <a:srgbClr val="00A6D6"/>
+              </a:buClr>
+              <a:buFont typeface="Arial"/>
+              <a:buChar char="•"/>
+              <a:defRPr sz="2400" kern="1200">
+                <a:solidFill>
+                  <a:schemeClr val="tx1"/>
+                </a:solidFill>
+                <a:latin typeface="Arial"/>
+                <a:ea typeface="+mn-ea"/>
+                <a:cs typeface="Arial"/>
+              </a:defRPr>
+            </a:lvl3pPr>
+            <a:lvl4pPr marL="1600200" indent="-228600" algn="l" defTabSz="457200" rtl="0" eaLnBrk="1" latinLnBrk="0" hangingPunct="1">
+              <a:spcBef>
+                <a:spcPct val="20000"/>
+              </a:spcBef>
+              <a:buFont typeface="Arial"/>
+              <a:buChar char="–"/>
+              <a:defRPr sz="2000" kern="1200">
+                <a:solidFill>
+                  <a:schemeClr val="tx1"/>
+                </a:solidFill>
+                <a:latin typeface="Arial"/>
+                <a:ea typeface="+mn-ea"/>
+                <a:cs typeface="Arial"/>
+              </a:defRPr>
+            </a:lvl4pPr>
+            <a:lvl5pPr marL="2057400" indent="-228600" algn="l" defTabSz="457200" rtl="0" eaLnBrk="1" latinLnBrk="0" hangingPunct="1">
+              <a:spcBef>
+                <a:spcPct val="20000"/>
+              </a:spcBef>
+              <a:buFont typeface="Arial"/>
+              <a:buChar char="»"/>
+              <a:defRPr sz="2000" kern="1200">
+                <a:solidFill>
+                  <a:schemeClr val="tx1"/>
+                </a:solidFill>
+                <a:latin typeface="Arial"/>
+                <a:ea typeface="+mn-ea"/>
+                <a:cs typeface="Arial"/>
+              </a:defRPr>
+            </a:lvl5pPr>
+            <a:lvl6pPr marL="2514600" indent="-228600" algn="l" defTabSz="457200" rtl="0" eaLnBrk="1" latinLnBrk="0" hangingPunct="1">
+              <a:spcBef>
+                <a:spcPct val="20000"/>
+              </a:spcBef>
+              <a:buFont typeface="Arial"/>
+              <a:buChar char="•"/>
+              <a:defRPr sz="2000" kern="1200">
+                <a:solidFill>
+                  <a:schemeClr val="tx1"/>
+                </a:solidFill>
+                <a:latin typeface="+mn-lt"/>
+                <a:ea typeface="+mn-ea"/>
+                <a:cs typeface="+mn-cs"/>
+              </a:defRPr>
+            </a:lvl6pPr>
+            <a:lvl7pPr marL="2971800" indent="-228600" algn="l" defTabSz="457200" rtl="0" eaLnBrk="1" latinLnBrk="0" hangingPunct="1">
+              <a:spcBef>
+                <a:spcPct val="20000"/>
+              </a:spcBef>
+              <a:buFont typeface="Arial"/>
+              <a:buChar char="•"/>
+              <a:defRPr sz="2000" kern="1200">
+                <a:solidFill>
+                  <a:schemeClr val="tx1"/>
+                </a:solidFill>
+                <a:latin typeface="+mn-lt"/>
+                <a:ea typeface="+mn-ea"/>
+                <a:cs typeface="+mn-cs"/>
+              </a:defRPr>
+            </a:lvl7pPr>
+            <a:lvl8pPr marL="3429000" indent="-228600" algn="l" defTabSz="457200" rtl="0" eaLnBrk="1" latinLnBrk="0" hangingPunct="1">
+              <a:spcBef>
+                <a:spcPct val="20000"/>
+              </a:spcBef>
+              <a:buFont typeface="Arial"/>
+              <a:buChar char="•"/>
+              <a:defRPr sz="2000" kern="1200">
+                <a:solidFill>
+                  <a:schemeClr val="tx1"/>
+                </a:solidFill>
+                <a:latin typeface="+mn-lt"/>
+                <a:ea typeface="+mn-ea"/>
+                <a:cs typeface="+mn-cs"/>
+              </a:defRPr>
+            </a:lvl8pPr>
+            <a:lvl9pPr marL="3886200" indent="-228600" algn="l" defTabSz="457200" rtl="0" eaLnBrk="1" latinLnBrk="0" hangingPunct="1">
+              <a:spcBef>
+                <a:spcPct val="20000"/>
+              </a:spcBef>
+              <a:buFont typeface="Arial"/>
+              <a:buChar char="•"/>
+              <a:defRPr sz="2000" kern="1200">
+                <a:solidFill>
+                  <a:schemeClr val="tx1"/>
+                </a:solidFill>
+                <a:latin typeface="+mn-lt"/>
+                <a:ea typeface="+mn-ea"/>
+                <a:cs typeface="+mn-cs"/>
+              </a:defRPr>
+            </a:lvl9pPr>
+          </a:lstStyle>
+          <a:p>
+            <a:endParaRPr lang="en-GB" sz="2000" dirty="0"/>
+          </a:p>
+        </p:txBody>
+      </p:sp>
+      <p:pic>
+        <p:nvPicPr>
+          <p:cNvPr id="5" name="Afbeelding 4">
+            <a:extLst>
+              <a:ext uri="{FF2B5EF4-FFF2-40B4-BE49-F238E27FC236}">
+                <a16:creationId xmlns:a16="http://schemas.microsoft.com/office/drawing/2014/main" id="{58C48BC2-E555-401C-B913-22FA8EAF75C3}"/>
+              </a:ext>
+            </a:extLst>
+          </p:cNvPr>
+          <p:cNvPicPr>
+            <a:picLocks noChangeAspect="1"/>
+          </p:cNvPicPr>
+          <p:nvPr/>
+        </p:nvPicPr>
+        <p:blipFill rotWithShape="1">
+          <a:blip r:embed="rId3"/>
+          <a:srcRect t="2344"/>
+          <a:stretch/>
+        </p:blipFill>
+        <p:spPr>
+          <a:xfrm>
+            <a:off x="2217287" y="1239871"/>
+            <a:ext cx="2003020" cy="3080071"/>
+          </a:xfrm>
+          <a:prstGeom prst="rect">
+            <a:avLst/>
+          </a:prstGeom>
+        </p:spPr>
+      </p:pic>
+      <p:pic>
+        <p:nvPicPr>
+          <p:cNvPr id="7" name="Afbeelding 6">
+            <a:extLst>
+              <a:ext uri="{FF2B5EF4-FFF2-40B4-BE49-F238E27FC236}">
+                <a16:creationId xmlns:a16="http://schemas.microsoft.com/office/drawing/2014/main" id="{DFE7F0EA-DB05-4753-AB55-A67598CA164D}"/>
+              </a:ext>
+            </a:extLst>
+          </p:cNvPr>
+          <p:cNvPicPr>
+            <a:picLocks noChangeAspect="1"/>
+          </p:cNvPicPr>
+          <p:nvPr/>
+        </p:nvPicPr>
+        <p:blipFill>
+          <a:blip r:embed="rId4"/>
+          <a:stretch>
+            <a:fillRect/>
+          </a:stretch>
+        </p:blipFill>
+        <p:spPr>
+          <a:xfrm>
+            <a:off x="4572000" y="1378617"/>
+            <a:ext cx="3946678" cy="2802578"/>
+          </a:xfrm>
+          <a:prstGeom prst="rect">
+            <a:avLst/>
+          </a:prstGeom>
+        </p:spPr>
+      </p:pic>
+    </p:spTree>
+    <p:extLst>
+      <p:ext uri="{BB962C8B-B14F-4D97-AF65-F5344CB8AC3E}">
+        <p14:creationId xmlns:p14="http://schemas.microsoft.com/office/powerpoint/2010/main" val="1370085809"/>
+      </p:ext>
+    </p:extLst>
+  </p:cSld>
+  <p:clrMapOvr>
+    <a:masterClrMapping/>
+  </p:clrMapOvr>
+</p:sld>
+</file>
+
+<file path=ppt/slides/slide3.xml><?xml version="1.0" encoding="utf-8"?>
 <p:sld xmlns:a="http://schemas.openxmlformats.org/drawingml/2006/main" xmlns:r="http://schemas.openxmlformats.org/officeDocument/2006/relationships" xmlns:p="http://schemas.openxmlformats.org/presentationml/2006/main">
   <p:cSld>
     <p:spTree>
@@ -4081,7 +5150,7 @@
 </p:sld>
 </file>
 
-<file path=ppt/slides/slide3.xml><?xml version="1.0" encoding="utf-8"?>
+<file path=ppt/slides/slide4.xml><?xml version="1.0" encoding="utf-8"?>
 <p:sld xmlns:a="http://schemas.openxmlformats.org/drawingml/2006/main" xmlns:r="http://schemas.openxmlformats.org/officeDocument/2006/relationships" xmlns:p="http://schemas.openxmlformats.org/presentationml/2006/main">
   <p:cSld>
     <p:spTree>
@@ -4410,7 +5479,7 @@
 </p:sld>
 </file>
 
-<file path=ppt/slides/slide4.xml><?xml version="1.0" encoding="utf-8"?>
+<file path=ppt/slides/slide5.xml><?xml version="1.0" encoding="utf-8"?>
 <p:sld xmlns:a="http://schemas.openxmlformats.org/drawingml/2006/main" xmlns:r="http://schemas.openxmlformats.org/officeDocument/2006/relationships" xmlns:p="http://schemas.openxmlformats.org/presentationml/2006/main">
   <p:cSld>
     <p:spTree>
@@ -4567,7 +5636,7 @@
 </p:sld>
 </file>
 
-<file path=ppt/slides/slide5.xml><?xml version="1.0" encoding="utf-8"?>
+<file path=ppt/slides/slide6.xml><?xml version="1.0" encoding="utf-8"?>
 <p:sld xmlns:a="http://schemas.openxmlformats.org/drawingml/2006/main" xmlns:r="http://schemas.openxmlformats.org/officeDocument/2006/relationships" xmlns:p="http://schemas.openxmlformats.org/presentationml/2006/main">
   <p:cSld>
     <p:spTree>
@@ -4805,7 +5874,7 @@
 </p:sld>
 </file>
 
-<file path=ppt/slides/slide6.xml><?xml version="1.0" encoding="utf-8"?>
+<file path=ppt/slides/slide7.xml><?xml version="1.0" encoding="utf-8"?>
 <p:sld xmlns:a="http://schemas.openxmlformats.org/drawingml/2006/main" xmlns:r="http://schemas.openxmlformats.org/officeDocument/2006/relationships" xmlns:p="http://schemas.openxmlformats.org/presentationml/2006/main">
   <p:cSld>
     <p:spTree>
@@ -4915,7 +5984,7 @@
 </p:sld>
 </file>
 
-<file path=ppt/slides/slide7.xml><?xml version="1.0" encoding="utf-8"?>
+<file path=ppt/slides/slide8.xml><?xml version="1.0" encoding="utf-8"?>
 <p:sld xmlns:a="http://schemas.openxmlformats.org/drawingml/2006/main" xmlns:r="http://schemas.openxmlformats.org/officeDocument/2006/relationships" xmlns:p="http://schemas.openxmlformats.org/presentationml/2006/main">
   <p:cSld>
     <p:spTree>
@@ -5040,7 +6109,7 @@
 </p:sld>
 </file>
 
-<file path=ppt/slides/slide8.xml><?xml version="1.0" encoding="utf-8"?>
+<file path=ppt/slides/slide9.xml><?xml version="1.0" encoding="utf-8"?>
 <p:sld xmlns:a="http://schemas.openxmlformats.org/drawingml/2006/main" xmlns:r="http://schemas.openxmlformats.org/officeDocument/2006/relationships" xmlns:p="http://schemas.openxmlformats.org/presentationml/2006/main">
   <p:cSld>
     <p:spTree>
@@ -5384,239 +6453,6 @@
     <p:extLst>
       <p:ext uri="{BB962C8B-B14F-4D97-AF65-F5344CB8AC3E}">
         <p14:creationId xmlns:p14="http://schemas.microsoft.com/office/powerpoint/2010/main" val="2604758383"/>
-      </p:ext>
-    </p:extLst>
-  </p:cSld>
-  <p:clrMapOvr>
-    <a:masterClrMapping/>
-  </p:clrMapOvr>
-</p:sld>
-</file>
-
-<file path=ppt/slides/slide9.xml><?xml version="1.0" encoding="utf-8"?>
-<p:sld xmlns:a="http://schemas.openxmlformats.org/drawingml/2006/main" xmlns:r="http://schemas.openxmlformats.org/officeDocument/2006/relationships" xmlns:p="http://schemas.openxmlformats.org/presentationml/2006/main">
-  <p:cSld>
-    <p:spTree>
-      <p:nvGrpSpPr>
-        <p:cNvPr id="1" name=""/>
-        <p:cNvGrpSpPr/>
-        <p:nvPr/>
-      </p:nvGrpSpPr>
-      <p:grpSpPr>
-        <a:xfrm>
-          <a:off x="0" y="0"/>
-          <a:ext cx="0" cy="0"/>
-          <a:chOff x="0" y="0"/>
-          <a:chExt cx="0" cy="0"/>
-        </a:xfrm>
-      </p:grpSpPr>
-      <p:sp>
-        <p:nvSpPr>
-          <p:cNvPr id="3" name="Tijdelijke aanduiding voor inhoud 2">
-            <a:extLst>
-              <a:ext uri="{FF2B5EF4-FFF2-40B4-BE49-F238E27FC236}">
-                <a16:creationId xmlns:a16="http://schemas.microsoft.com/office/drawing/2014/main" id="{4BDD7784-D850-43C8-A462-B1828A78467F}"/>
-              </a:ext>
-            </a:extLst>
-          </p:cNvPr>
-          <p:cNvSpPr>
-            <a:spLocks noGrp="1"/>
-          </p:cNvSpPr>
-          <p:nvPr>
-            <p:ph idx="1"/>
-          </p:nvPr>
-        </p:nvSpPr>
-        <p:spPr/>
-        <p:txBody>
-          <a:bodyPr>
-            <a:normAutofit lnSpcReduction="10000"/>
-          </a:bodyPr>
-          <a:lstStyle/>
-          <a:p>
-            <a:r>
-              <a:rPr lang="en-GB" dirty="0"/>
-              <a:t>The spoiler is modelled as a beam using the Euler-</a:t>
-            </a:r>
-            <a:r>
-              <a:rPr lang="en-GB" dirty="0" err="1"/>
-              <a:t>Bernouli</a:t>
-            </a:r>
-            <a:r>
-              <a:rPr lang="en-GB" dirty="0"/>
-              <a:t> beam theory.</a:t>
-            </a:r>
-          </a:p>
-          <a:p>
-            <a:endParaRPr lang="en-GB" dirty="0"/>
-          </a:p>
-          <a:p>
-            <a:endParaRPr lang="en-GB" dirty="0"/>
-          </a:p>
-          <a:p>
-            <a:r>
-              <a:rPr lang="en-GB" dirty="0"/>
-              <a:t>Bending and shear is </a:t>
-            </a:r>
-            <a:br>
-              <a:rPr lang="en-GB" dirty="0"/>
-            </a:br>
-            <a:r>
-              <a:rPr lang="en-GB" dirty="0"/>
-              <a:t>calculated using the </a:t>
-            </a:r>
-            <a:br>
-              <a:rPr lang="en-GB" dirty="0"/>
-            </a:br>
-            <a:r>
-              <a:rPr lang="en-GB" dirty="0"/>
-              <a:t>methods described in </a:t>
-            </a:r>
-            <a:br>
-              <a:rPr lang="en-GB" dirty="0"/>
-            </a:br>
-            <a:r>
-              <a:rPr lang="en-GB" dirty="0" err="1"/>
-              <a:t>Megson</a:t>
-            </a:r>
-            <a:r>
-              <a:rPr lang="en-GB" dirty="0"/>
-              <a:t>.</a:t>
-            </a:r>
-          </a:p>
-          <a:p>
-            <a:endParaRPr lang="en-GB" dirty="0"/>
-          </a:p>
-          <a:p>
-            <a:pPr lvl="1"/>
-            <a:endParaRPr lang="nl-NL" b="0" dirty="0"/>
-          </a:p>
-          <a:p>
-            <a:pPr lvl="1"/>
-            <a:endParaRPr lang="en-GB" dirty="0"/>
-          </a:p>
-          <a:p>
-            <a:pPr marL="457200" lvl="1" indent="0">
-              <a:buNone/>
-            </a:pPr>
-            <a:endParaRPr lang="en-GB" dirty="0"/>
-          </a:p>
-        </p:txBody>
-      </p:sp>
-      <p:pic>
-        <p:nvPicPr>
-          <p:cNvPr id="2050" name="Picture 2" descr="encrypted-tbn0.gstatic.com/images?q=tbn:ANd9GcT...">
-            <a:extLst>
-              <a:ext uri="{FF2B5EF4-FFF2-40B4-BE49-F238E27FC236}">
-                <a16:creationId xmlns:a16="http://schemas.microsoft.com/office/drawing/2014/main" id="{96AD8779-3E5D-4A82-957E-2D1E51D26DDD}"/>
-              </a:ext>
-            </a:extLst>
-          </p:cNvPr>
-          <p:cNvPicPr>
-            <a:picLocks noChangeAspect="1" noChangeArrowheads="1"/>
-          </p:cNvPicPr>
-          <p:nvPr/>
-        </p:nvPicPr>
-        <p:blipFill>
-          <a:blip r:embed="rId2">
-            <a:extLst>
-              <a:ext uri="{28A0092B-C50C-407E-A947-70E740481C1C}">
-                <a14:useLocalDpi xmlns:a14="http://schemas.microsoft.com/office/drawing/2010/main" val="0"/>
-              </a:ext>
-            </a:extLst>
-          </a:blip>
-          <a:srcRect/>
-          <a:stretch>
-            <a:fillRect/>
-          </a:stretch>
-        </p:blipFill>
-        <p:spPr bwMode="auto">
-          <a:xfrm>
-            <a:off x="6429440" y="2598359"/>
-            <a:ext cx="1902908" cy="2338044"/>
-          </a:xfrm>
-          <a:prstGeom prst="rect">
-            <a:avLst/>
-          </a:prstGeom>
-          <a:noFill/>
-          <a:extLst>
-            <a:ext uri="{909E8E84-426E-40DD-AFC4-6F175D3DCCD1}">
-              <a14:hiddenFill xmlns:a14="http://schemas.microsoft.com/office/drawing/2010/main">
-                <a:solidFill>
-                  <a:srgbClr val="FFFFFF"/>
-                </a:solidFill>
-              </a14:hiddenFill>
-            </a:ext>
-          </a:extLst>
-        </p:spPr>
-      </p:pic>
-      <p:sp>
-        <p:nvSpPr>
-          <p:cNvPr id="2" name="Title 1"/>
-          <p:cNvSpPr>
-            <a:spLocks noGrp="1"/>
-          </p:cNvSpPr>
-          <p:nvPr>
-            <p:ph type="title"/>
-          </p:nvPr>
-        </p:nvSpPr>
-        <p:spPr>
-          <a:xfrm>
-            <a:off x="1708304" y="207097"/>
-            <a:ext cx="7603588" cy="857250"/>
-          </a:xfrm>
-        </p:spPr>
-        <p:txBody>
-          <a:bodyPr>
-            <a:normAutofit/>
-          </a:bodyPr>
-          <a:lstStyle/>
-          <a:p>
-            <a:r>
-              <a:rPr lang="en-US" sz="3200" dirty="0"/>
-              <a:t>Structural analysis: bending calculations</a:t>
-            </a:r>
-          </a:p>
-        </p:txBody>
-      </p:sp>
-      <p:pic>
-        <p:nvPicPr>
-          <p:cNvPr id="4" name="Afbeelding 3">
-            <a:extLst>
-              <a:ext uri="{FF2B5EF4-FFF2-40B4-BE49-F238E27FC236}">
-                <a16:creationId xmlns:a16="http://schemas.microsoft.com/office/drawing/2014/main" id="{5E8E0B81-69D6-481C-927D-59C6E20FF982}"/>
-              </a:ext>
-            </a:extLst>
-          </p:cNvPr>
-          <p:cNvPicPr>
-            <a:picLocks noChangeAspect="1"/>
-          </p:cNvPicPr>
-          <p:nvPr/>
-        </p:nvPicPr>
-        <p:blipFill>
-          <a:blip r:embed="rId3"/>
-          <a:stretch>
-            <a:fillRect/>
-          </a:stretch>
-        </p:blipFill>
-        <p:spPr>
-          <a:xfrm>
-            <a:off x="2645817" y="2103399"/>
-            <a:ext cx="3246401" cy="685859"/>
-          </a:xfrm>
-          <a:prstGeom prst="rect">
-            <a:avLst/>
-          </a:prstGeom>
-          <a:ln>
-            <a:solidFill>
-              <a:schemeClr val="tx1"/>
-            </a:solidFill>
-          </a:ln>
-        </p:spPr>
-      </p:pic>
-    </p:spTree>
-    <p:extLst>
-      <p:ext uri="{BB962C8B-B14F-4D97-AF65-F5344CB8AC3E}">
-        <p14:creationId xmlns:p14="http://schemas.microsoft.com/office/powerpoint/2010/main" val="3674575570"/>
       </p:ext>
     </p:extLst>
   </p:cSld>
@@ -6265,6 +7101,301 @@
 </file>
 
 <file path=ppt/theme/theme3.xml><?xml version="1.0" encoding="utf-8"?>
+<a:theme xmlns:a="http://schemas.openxmlformats.org/drawingml/2006/main" name="Kantoorthema">
+  <a:themeElements>
+    <a:clrScheme name="Office">
+      <a:dk1>
+        <a:sysClr val="windowText" lastClr="000000"/>
+      </a:dk1>
+      <a:lt1>
+        <a:sysClr val="window" lastClr="FFFFFF"/>
+      </a:lt1>
+      <a:dk2>
+        <a:srgbClr val="44546A"/>
+      </a:dk2>
+      <a:lt2>
+        <a:srgbClr val="E7E6E6"/>
+      </a:lt2>
+      <a:accent1>
+        <a:srgbClr val="4472C4"/>
+      </a:accent1>
+      <a:accent2>
+        <a:srgbClr val="ED7D31"/>
+      </a:accent2>
+      <a:accent3>
+        <a:srgbClr val="A5A5A5"/>
+      </a:accent3>
+      <a:accent4>
+        <a:srgbClr val="FFC000"/>
+      </a:accent4>
+      <a:accent5>
+        <a:srgbClr val="5B9BD5"/>
+      </a:accent5>
+      <a:accent6>
+        <a:srgbClr val="70AD47"/>
+      </a:accent6>
+      <a:hlink>
+        <a:srgbClr val="0563C1"/>
+      </a:hlink>
+      <a:folHlink>
+        <a:srgbClr val="954F72"/>
+      </a:folHlink>
+    </a:clrScheme>
+    <a:fontScheme name="Office">
+      <a:majorFont>
+        <a:latin typeface="Calibri Light" panose="020F0302020204030204"/>
+        <a:ea typeface=""/>
+        <a:cs typeface=""/>
+        <a:font script="Jpan" typeface="游ゴシック Light"/>
+        <a:font script="Hang" typeface="맑은 고딕"/>
+        <a:font script="Hans" typeface="等线 Light"/>
+        <a:font script="Hant" typeface="新細明體"/>
+        <a:font script="Arab" typeface="Times New Roman"/>
+        <a:font script="Hebr" typeface="Times New Roman"/>
+        <a:font script="Thai" typeface="Angsana New"/>
+        <a:font script="Ethi" typeface="Nyala"/>
+        <a:font script="Beng" typeface="Vrinda"/>
+        <a:font script="Gujr" typeface="Shruti"/>
+        <a:font script="Khmr" typeface="MoolBoran"/>
+        <a:font script="Knda" typeface="Tunga"/>
+        <a:font script="Guru" typeface="Raavi"/>
+        <a:font script="Cans" typeface="Euphemia"/>
+        <a:font script="Cher" typeface="Plantagenet Cherokee"/>
+        <a:font script="Yiii" typeface="Microsoft Yi Baiti"/>
+        <a:font script="Tibt" typeface="Microsoft Himalaya"/>
+        <a:font script="Thaa" typeface="MV Boli"/>
+        <a:font script="Deva" typeface="Mangal"/>
+        <a:font script="Telu" typeface="Gautami"/>
+        <a:font script="Taml" typeface="Latha"/>
+        <a:font script="Syrc" typeface="Estrangelo Edessa"/>
+        <a:font script="Orya" typeface="Kalinga"/>
+        <a:font script="Mlym" typeface="Kartika"/>
+        <a:font script="Laoo" typeface="DokChampa"/>
+        <a:font script="Sinh" typeface="Iskoola Pota"/>
+        <a:font script="Mong" typeface="Mongolian Baiti"/>
+        <a:font script="Viet" typeface="Times New Roman"/>
+        <a:font script="Uigh" typeface="Microsoft Uighur"/>
+        <a:font script="Geor" typeface="Sylfaen"/>
+        <a:font script="Armn" typeface="Arial"/>
+        <a:font script="Bugi" typeface="Leelawadee UI"/>
+        <a:font script="Bopo" typeface="Microsoft JhengHei"/>
+        <a:font script="Java" typeface="Javanese Text"/>
+        <a:font script="Lisu" typeface="Segoe UI"/>
+        <a:font script="Mymr" typeface="Myanmar Text"/>
+        <a:font script="Nkoo" typeface="Ebrima"/>
+        <a:font script="Olck" typeface="Nirmala UI"/>
+        <a:font script="Osma" typeface="Ebrima"/>
+        <a:font script="Phag" typeface="Phagspa"/>
+        <a:font script="Syrn" typeface="Estrangelo Edessa"/>
+        <a:font script="Syrj" typeface="Estrangelo Edessa"/>
+        <a:font script="Syre" typeface="Estrangelo Edessa"/>
+        <a:font script="Sora" typeface="Nirmala UI"/>
+        <a:font script="Tale" typeface="Microsoft Tai Le"/>
+        <a:font script="Talu" typeface="Microsoft New Tai Lue"/>
+        <a:font script="Tfng" typeface="Ebrima"/>
+      </a:majorFont>
+      <a:minorFont>
+        <a:latin typeface="Calibri" panose="020F0502020204030204"/>
+        <a:ea typeface=""/>
+        <a:cs typeface=""/>
+        <a:font script="Jpan" typeface="游ゴシック"/>
+        <a:font script="Hang" typeface="맑은 고딕"/>
+        <a:font script="Hans" typeface="等线"/>
+        <a:font script="Hant" typeface="新細明體"/>
+        <a:font script="Arab" typeface="Arial"/>
+        <a:font script="Hebr" typeface="Arial"/>
+        <a:font script="Thai" typeface="Cordia New"/>
+        <a:font script="Ethi" typeface="Nyala"/>
+        <a:font script="Beng" typeface="Vrinda"/>
+        <a:font script="Gujr" typeface="Shruti"/>
+        <a:font script="Khmr" typeface="DaunPenh"/>
+        <a:font script="Knda" typeface="Tunga"/>
+        <a:font script="Guru" typeface="Raavi"/>
+        <a:font script="Cans" typeface="Euphemia"/>
+        <a:font script="Cher" typeface="Plantagenet Cherokee"/>
+        <a:font script="Yiii" typeface="Microsoft Yi Baiti"/>
+        <a:font script="Tibt" typeface="Microsoft Himalaya"/>
+        <a:font script="Thaa" typeface="MV Boli"/>
+        <a:font script="Deva" typeface="Mangal"/>
+        <a:font script="Telu" typeface="Gautami"/>
+        <a:font script="Taml" typeface="Latha"/>
+        <a:font script="Syrc" typeface="Estrangelo Edessa"/>
+        <a:font script="Orya" typeface="Kalinga"/>
+        <a:font script="Mlym" typeface="Kartika"/>
+        <a:font script="Laoo" typeface="DokChampa"/>
+        <a:font script="Sinh" typeface="Iskoola Pota"/>
+        <a:font script="Mong" typeface="Mongolian Baiti"/>
+        <a:font script="Viet" typeface="Arial"/>
+        <a:font script="Uigh" typeface="Microsoft Uighur"/>
+        <a:font script="Geor" typeface="Sylfaen"/>
+        <a:font script="Armn" typeface="Arial"/>
+        <a:font script="Bugi" typeface="Leelawadee UI"/>
+        <a:font script="Bopo" typeface="Microsoft JhengHei"/>
+        <a:font script="Java" typeface="Javanese Text"/>
+        <a:font script="Lisu" typeface="Segoe UI"/>
+        <a:font script="Mymr" typeface="Myanmar Text"/>
+        <a:font script="Nkoo" typeface="Ebrima"/>
+        <a:font script="Olck" typeface="Nirmala UI"/>
+        <a:font script="Osma" typeface="Ebrima"/>
+        <a:font script="Phag" typeface="Phagspa"/>
+        <a:font script="Syrn" typeface="Estrangelo Edessa"/>
+        <a:font script="Syrj" typeface="Estrangelo Edessa"/>
+        <a:font script="Syre" typeface="Estrangelo Edessa"/>
+        <a:font script="Sora" typeface="Nirmala UI"/>
+        <a:font script="Tale" typeface="Microsoft Tai Le"/>
+        <a:font script="Talu" typeface="Microsoft New Tai Lue"/>
+        <a:font script="Tfng" typeface="Ebrima"/>
+      </a:minorFont>
+    </a:fontScheme>
+    <a:fmtScheme name="Office">
+      <a:fillStyleLst>
+        <a:solidFill>
+          <a:schemeClr val="phClr"/>
+        </a:solidFill>
+        <a:gradFill rotWithShape="1">
+          <a:gsLst>
+            <a:gs pos="0">
+              <a:schemeClr val="phClr">
+                <a:lumMod val="110000"/>
+                <a:satMod val="105000"/>
+                <a:tint val="67000"/>
+              </a:schemeClr>
+            </a:gs>
+            <a:gs pos="50000">
+              <a:schemeClr val="phClr">
+                <a:lumMod val="105000"/>
+                <a:satMod val="103000"/>
+                <a:tint val="73000"/>
+              </a:schemeClr>
+            </a:gs>
+            <a:gs pos="100000">
+              <a:schemeClr val="phClr">
+                <a:lumMod val="105000"/>
+                <a:satMod val="109000"/>
+                <a:tint val="81000"/>
+              </a:schemeClr>
+            </a:gs>
+          </a:gsLst>
+          <a:lin ang="5400000" scaled="0"/>
+        </a:gradFill>
+        <a:gradFill rotWithShape="1">
+          <a:gsLst>
+            <a:gs pos="0">
+              <a:schemeClr val="phClr">
+                <a:satMod val="103000"/>
+                <a:lumMod val="102000"/>
+                <a:tint val="94000"/>
+              </a:schemeClr>
+            </a:gs>
+            <a:gs pos="50000">
+              <a:schemeClr val="phClr">
+                <a:satMod val="110000"/>
+                <a:lumMod val="100000"/>
+                <a:shade val="100000"/>
+              </a:schemeClr>
+            </a:gs>
+            <a:gs pos="100000">
+              <a:schemeClr val="phClr">
+                <a:lumMod val="99000"/>
+                <a:satMod val="120000"/>
+                <a:shade val="78000"/>
+              </a:schemeClr>
+            </a:gs>
+          </a:gsLst>
+          <a:lin ang="5400000" scaled="0"/>
+        </a:gradFill>
+      </a:fillStyleLst>
+      <a:lnStyleLst>
+        <a:ln w="6350" cap="flat" cmpd="sng" algn="ctr">
+          <a:solidFill>
+            <a:schemeClr val="phClr"/>
+          </a:solidFill>
+          <a:prstDash val="solid"/>
+          <a:miter lim="800000"/>
+        </a:ln>
+        <a:ln w="12700" cap="flat" cmpd="sng" algn="ctr">
+          <a:solidFill>
+            <a:schemeClr val="phClr"/>
+          </a:solidFill>
+          <a:prstDash val="solid"/>
+          <a:miter lim="800000"/>
+        </a:ln>
+        <a:ln w="19050" cap="flat" cmpd="sng" algn="ctr">
+          <a:solidFill>
+            <a:schemeClr val="phClr"/>
+          </a:solidFill>
+          <a:prstDash val="solid"/>
+          <a:miter lim="800000"/>
+        </a:ln>
+      </a:lnStyleLst>
+      <a:effectStyleLst>
+        <a:effectStyle>
+          <a:effectLst/>
+        </a:effectStyle>
+        <a:effectStyle>
+          <a:effectLst/>
+        </a:effectStyle>
+        <a:effectStyle>
+          <a:effectLst>
+            <a:outerShdw blurRad="57150" dist="19050" dir="5400000" algn="ctr" rotWithShape="0">
+              <a:srgbClr val="000000">
+                <a:alpha val="63000"/>
+              </a:srgbClr>
+            </a:outerShdw>
+          </a:effectLst>
+        </a:effectStyle>
+      </a:effectStyleLst>
+      <a:bgFillStyleLst>
+        <a:solidFill>
+          <a:schemeClr val="phClr"/>
+        </a:solidFill>
+        <a:solidFill>
+          <a:schemeClr val="phClr">
+            <a:tint val="95000"/>
+            <a:satMod val="170000"/>
+          </a:schemeClr>
+        </a:solidFill>
+        <a:gradFill rotWithShape="1">
+          <a:gsLst>
+            <a:gs pos="0">
+              <a:schemeClr val="phClr">
+                <a:tint val="93000"/>
+                <a:satMod val="150000"/>
+                <a:shade val="98000"/>
+                <a:lumMod val="102000"/>
+              </a:schemeClr>
+            </a:gs>
+            <a:gs pos="50000">
+              <a:schemeClr val="phClr">
+                <a:tint val="98000"/>
+                <a:satMod val="130000"/>
+                <a:shade val="90000"/>
+                <a:lumMod val="103000"/>
+              </a:schemeClr>
+            </a:gs>
+            <a:gs pos="100000">
+              <a:schemeClr val="phClr">
+                <a:shade val="63000"/>
+                <a:satMod val="120000"/>
+              </a:schemeClr>
+            </a:gs>
+          </a:gsLst>
+          <a:lin ang="5400000" scaled="0"/>
+        </a:gradFill>
+      </a:bgFillStyleLst>
+    </a:fmtScheme>
+  </a:themeElements>
+  <a:objectDefaults/>
+  <a:extraClrSchemeLst/>
+  <a:extLst>
+    <a:ext uri="{05A4C25C-085E-4340-85A3-A5531E510DB2}">
+      <thm15:themeFamily xmlns:thm15="http://schemas.microsoft.com/office/thememl/2012/main" name="Office Theme" id="{62F939B6-93AF-4DB8-9C6B-D6C7DFDC589F}" vid="{4A3C46E8-61CC-4603-A589-7422A47A8E4A}"/>
+    </a:ext>
+  </a:extLst>
+</a:theme>
+</file>
+
+<file path=ppt/theme/theme4.xml><?xml version="1.0" encoding="utf-8"?>
 <a:theme xmlns:a="http://schemas.openxmlformats.org/drawingml/2006/main" name="Office Theme">
   <a:themeElements>
     <a:clrScheme name="Office">

</xml_diff>